<commit_message>
Changes to statistical section using different selection of flares, January 2024 (second reviewer response)
</commit_message>
<xml_diff>
--- a/flaredurs.pptx
+++ b/flaredurs.pptx
@@ -5,11 +5,13 @@
     <p:sldMasterId id="2147483648" r:id="rId1"/>
   </p:sldMasterIdLst>
   <p:notesMasterIdLst>
-    <p:notesMasterId r:id="rId4"/>
+    <p:notesMasterId r:id="rId6"/>
   </p:notesMasterIdLst>
   <p:sldIdLst>
     <p:sldId id="256" r:id="rId2"/>
     <p:sldId id="257" r:id="rId3"/>
+    <p:sldId id="258" r:id="rId4"/>
+    <p:sldId id="259" r:id="rId5"/>
   </p:sldIdLst>
   <p:sldSz cx="12192000" cy="6858000"/>
   <p:notesSz cx="6858000" cy="9144000"/>
@@ -198,7 +200,7 @@
           <a:p>
             <a:fld id="{FF93A664-D126-DB44-87D9-436527C5F2E5}" type="datetimeFigureOut">
               <a:rPr lang="en-US" smtClean="0"/>
-              <a:t>9/27/23</a:t>
+              <a:t>1/12/24</a:t>
             </a:fld>
             <a:endParaRPr lang="en-US"/>
           </a:p>
@@ -549,6 +551,90 @@
 </p:notes>
 </file>
 
+<file path=ppt/notesSlides/notesSlide2.xml><?xml version="1.0" encoding="utf-8"?>
+<p:notes xmlns:a="http://schemas.openxmlformats.org/drawingml/2006/main" xmlns:r="http://schemas.openxmlformats.org/officeDocument/2006/relationships" xmlns:p="http://schemas.openxmlformats.org/presentationml/2006/main">
+  <p:cSld>
+    <p:spTree>
+      <p:nvGrpSpPr>
+        <p:cNvPr id="1" name=""/>
+        <p:cNvGrpSpPr/>
+        <p:nvPr/>
+      </p:nvGrpSpPr>
+      <p:grpSpPr>
+        <a:xfrm>
+          <a:off x="0" y="0"/>
+          <a:ext cx="0" cy="0"/>
+          <a:chOff x="0" y="0"/>
+          <a:chExt cx="0" cy="0"/>
+        </a:xfrm>
+      </p:grpSpPr>
+      <p:sp>
+        <p:nvSpPr>
+          <p:cNvPr id="2" name="Slide Image Placeholder 1"/>
+          <p:cNvSpPr>
+            <a:spLocks noGrp="1" noRot="1" noChangeAspect="1"/>
+          </p:cNvSpPr>
+          <p:nvPr>
+            <p:ph type="sldImg"/>
+          </p:nvPr>
+        </p:nvSpPr>
+        <p:spPr/>
+      </p:sp>
+      <p:sp>
+        <p:nvSpPr>
+          <p:cNvPr id="3" name="Notes Placeholder 2"/>
+          <p:cNvSpPr>
+            <a:spLocks noGrp="1"/>
+          </p:cNvSpPr>
+          <p:nvPr>
+            <p:ph type="body" idx="1"/>
+          </p:nvPr>
+        </p:nvSpPr>
+        <p:spPr/>
+        <p:txBody>
+          <a:bodyPr/>
+          <a:lstStyle/>
+          <a:p>
+            <a:endParaRPr lang="en-US" dirty="0"/>
+          </a:p>
+        </p:txBody>
+      </p:sp>
+      <p:sp>
+        <p:nvSpPr>
+          <p:cNvPr id="4" name="Slide Number Placeholder 3"/>
+          <p:cNvSpPr>
+            <a:spLocks noGrp="1"/>
+          </p:cNvSpPr>
+          <p:nvPr>
+            <p:ph type="sldNum" sz="quarter" idx="5"/>
+          </p:nvPr>
+        </p:nvSpPr>
+        <p:spPr/>
+        <p:txBody>
+          <a:bodyPr/>
+          <a:lstStyle/>
+          <a:p>
+            <a:fld id="{FF804F10-4A82-A248-9B32-9124469F6430}" type="slidenum">
+              <a:rPr lang="en-US" smtClean="0"/>
+              <a:t>3</a:t>
+            </a:fld>
+            <a:endParaRPr lang="en-US"/>
+          </a:p>
+        </p:txBody>
+      </p:sp>
+    </p:spTree>
+    <p:extLst>
+      <p:ext uri="{BB962C8B-B14F-4D97-AF65-F5344CB8AC3E}">
+        <p14:creationId xmlns:p14="http://schemas.microsoft.com/office/powerpoint/2010/main" val="4150139303"/>
+      </p:ext>
+    </p:extLst>
+  </p:cSld>
+  <p:clrMapOvr>
+    <a:masterClrMapping/>
+  </p:clrMapOvr>
+</p:notes>
+</file>
+
 <file path=ppt/slideLayouts/slideLayout1.xml><?xml version="1.0" encoding="utf-8"?>
 <p:sldLayout xmlns:a="http://schemas.openxmlformats.org/drawingml/2006/main" xmlns:r="http://schemas.openxmlformats.org/officeDocument/2006/relationships" xmlns:p="http://schemas.openxmlformats.org/presentationml/2006/main" type="title" preserve="1">
   <p:cSld name="Title Slide">
@@ -696,7 +782,7 @@
           <a:p>
             <a:fld id="{32A03D38-162D-6B47-8553-9CD5AB2EE2B5}" type="datetimeFigureOut">
               <a:rPr lang="en-US" smtClean="0"/>
-              <a:t>9/27/23</a:t>
+              <a:t>1/12/24</a:t>
             </a:fld>
             <a:endParaRPr lang="en-US"/>
           </a:p>
@@ -894,7 +980,7 @@
           <a:p>
             <a:fld id="{32A03D38-162D-6B47-8553-9CD5AB2EE2B5}" type="datetimeFigureOut">
               <a:rPr lang="en-US" smtClean="0"/>
-              <a:t>9/27/23</a:t>
+              <a:t>1/12/24</a:t>
             </a:fld>
             <a:endParaRPr lang="en-US"/>
           </a:p>
@@ -1102,7 +1188,7 @@
           <a:p>
             <a:fld id="{32A03D38-162D-6B47-8553-9CD5AB2EE2B5}" type="datetimeFigureOut">
               <a:rPr lang="en-US" smtClean="0"/>
-              <a:t>9/27/23</a:t>
+              <a:t>1/12/24</a:t>
             </a:fld>
             <a:endParaRPr lang="en-US"/>
           </a:p>
@@ -1300,7 +1386,7 @@
           <a:p>
             <a:fld id="{32A03D38-162D-6B47-8553-9CD5AB2EE2B5}" type="datetimeFigureOut">
               <a:rPr lang="en-US" smtClean="0"/>
-              <a:t>9/27/23</a:t>
+              <a:t>1/12/24</a:t>
             </a:fld>
             <a:endParaRPr lang="en-US"/>
           </a:p>
@@ -1575,7 +1661,7 @@
           <a:p>
             <a:fld id="{32A03D38-162D-6B47-8553-9CD5AB2EE2B5}" type="datetimeFigureOut">
               <a:rPr lang="en-US" smtClean="0"/>
-              <a:t>9/27/23</a:t>
+              <a:t>1/12/24</a:t>
             </a:fld>
             <a:endParaRPr lang="en-US"/>
           </a:p>
@@ -1840,7 +1926,7 @@
           <a:p>
             <a:fld id="{32A03D38-162D-6B47-8553-9CD5AB2EE2B5}" type="datetimeFigureOut">
               <a:rPr lang="en-US" smtClean="0"/>
-              <a:t>9/27/23</a:t>
+              <a:t>1/12/24</a:t>
             </a:fld>
             <a:endParaRPr lang="en-US"/>
           </a:p>
@@ -2252,7 +2338,7 @@
           <a:p>
             <a:fld id="{32A03D38-162D-6B47-8553-9CD5AB2EE2B5}" type="datetimeFigureOut">
               <a:rPr lang="en-US" smtClean="0"/>
-              <a:t>9/27/23</a:t>
+              <a:t>1/12/24</a:t>
             </a:fld>
             <a:endParaRPr lang="en-US"/>
           </a:p>
@@ -2393,7 +2479,7 @@
           <a:p>
             <a:fld id="{32A03D38-162D-6B47-8553-9CD5AB2EE2B5}" type="datetimeFigureOut">
               <a:rPr lang="en-US" smtClean="0"/>
-              <a:t>9/27/23</a:t>
+              <a:t>1/12/24</a:t>
             </a:fld>
             <a:endParaRPr lang="en-US"/>
           </a:p>
@@ -2506,7 +2592,7 @@
           <a:p>
             <a:fld id="{32A03D38-162D-6B47-8553-9CD5AB2EE2B5}" type="datetimeFigureOut">
               <a:rPr lang="en-US" smtClean="0"/>
-              <a:t>9/27/23</a:t>
+              <a:t>1/12/24</a:t>
             </a:fld>
             <a:endParaRPr lang="en-US"/>
           </a:p>
@@ -2817,7 +2903,7 @@
           <a:p>
             <a:fld id="{32A03D38-162D-6B47-8553-9CD5AB2EE2B5}" type="datetimeFigureOut">
               <a:rPr lang="en-US" smtClean="0"/>
-              <a:t>9/27/23</a:t>
+              <a:t>1/12/24</a:t>
             </a:fld>
             <a:endParaRPr lang="en-US"/>
           </a:p>
@@ -3105,7 +3191,7 @@
           <a:p>
             <a:fld id="{32A03D38-162D-6B47-8553-9CD5AB2EE2B5}" type="datetimeFigureOut">
               <a:rPr lang="en-US" smtClean="0"/>
-              <a:t>9/27/23</a:t>
+              <a:t>1/12/24</a:t>
             </a:fld>
             <a:endParaRPr lang="en-US"/>
           </a:p>
@@ -3346,7 +3432,7 @@
           <a:p>
             <a:fld id="{32A03D38-162D-6B47-8553-9CD5AB2EE2B5}" type="datetimeFigureOut">
               <a:rPr lang="en-US" smtClean="0"/>
-              <a:t>9/27/23</a:t>
+              <a:t>1/12/24</a:t>
             </a:fld>
             <a:endParaRPr lang="en-US"/>
           </a:p>
@@ -3765,10 +3851,10 @@
       </p:grpSpPr>
       <p:pic>
         <p:nvPicPr>
-          <p:cNvPr id="2" name="Picture 1">
-            <a:extLst>
-              <a:ext uri="{FF2B5EF4-FFF2-40B4-BE49-F238E27FC236}">
-                <a16:creationId xmlns:a16="http://schemas.microsoft.com/office/drawing/2014/main" id="{3CFF17B9-FC30-D0F7-0750-3087C7CF4218}"/>
+          <p:cNvPr id="10" name="Picture 9">
+            <a:extLst>
+              <a:ext uri="{FF2B5EF4-FFF2-40B4-BE49-F238E27FC236}">
+                <a16:creationId xmlns:a16="http://schemas.microsoft.com/office/drawing/2014/main" id="{7E8B758B-D82F-2BB6-5366-36EA3FA5A2E5}"/>
               </a:ext>
             </a:extLst>
           </p:cNvPr>
@@ -3785,8 +3871,8 @@
         </p:blipFill>
         <p:spPr>
           <a:xfrm>
-            <a:off x="1656758" y="1301129"/>
-            <a:ext cx="11204999" cy="4309614"/>
+            <a:off x="1625078" y="1299617"/>
+            <a:ext cx="11294421" cy="4344007"/>
           </a:xfrm>
           <a:prstGeom prst="rect">
             <a:avLst/>
@@ -3848,47 +3934,8 @@
         </p:nvSpPr>
         <p:spPr>
           <a:xfrm rot="16200000">
-            <a:off x="1678749" y="3199221"/>
-            <a:ext cx="2148323" cy="292388"/>
-          </a:xfrm>
-          <a:prstGeom prst="rect">
-            <a:avLst/>
-          </a:prstGeom>
-          <a:noFill/>
-        </p:spPr>
-        <p:txBody>
-          <a:bodyPr wrap="square" rtlCol="0">
-            <a:spAutoFit/>
-          </a:bodyPr>
-          <a:lstStyle/>
-          <a:p>
-            <a:r>
-              <a:rPr lang="en-US" sz="1300" dirty="0">
-                <a:latin typeface="Tahoma" panose="020B0604030504040204" pitchFamily="34" charset="0"/>
-                <a:ea typeface="Tahoma" panose="020B0604030504040204" pitchFamily="34" charset="0"/>
-                <a:cs typeface="Tahoma" panose="020B0604030504040204" pitchFamily="34" charset="0"/>
-              </a:rPr>
-              <a:t>Rise Phase Duration</a:t>
-            </a:r>
-          </a:p>
-        </p:txBody>
-      </p:sp>
-      <p:sp>
-        <p:nvSpPr>
-          <p:cNvPr id="17" name="TextBox 16">
-            <a:extLst>
-              <a:ext uri="{FF2B5EF4-FFF2-40B4-BE49-F238E27FC236}">
-                <a16:creationId xmlns:a16="http://schemas.microsoft.com/office/drawing/2014/main" id="{4CA0E9CB-4B34-6CBA-8392-58F17A41B4D7}"/>
-              </a:ext>
-            </a:extLst>
-          </p:cNvPr>
-          <p:cNvSpPr txBox="1"/>
-          <p:nvPr/>
-        </p:nvSpPr>
-        <p:spPr>
-          <a:xfrm>
-            <a:off x="3438522" y="5360535"/>
-            <a:ext cx="1831127" cy="303919"/>
+            <a:off x="1259885" y="3051199"/>
+            <a:ext cx="2872802" cy="292388"/>
           </a:xfrm>
           <a:prstGeom prst="rect">
             <a:avLst/>
@@ -3909,17 +3956,46 @@
                 <a:ea typeface="Tahoma" panose="020B0604030504040204" pitchFamily="34" charset="0"/>
                 <a:cs typeface="Tahoma" panose="020B0604030504040204" pitchFamily="34" charset="0"/>
               </a:rPr>
-              <a:t> </a:t>
-            </a:r>
-          </a:p>
-        </p:txBody>
-      </p:sp>
-      <p:sp>
-        <p:nvSpPr>
-          <p:cNvPr id="13" name="TextBox 12">
-            <a:extLst>
-              <a:ext uri="{FF2B5EF4-FFF2-40B4-BE49-F238E27FC236}">
-                <a16:creationId xmlns:a16="http://schemas.microsoft.com/office/drawing/2014/main" id="{6A109587-CE01-DD07-A647-BFE0F9357E5A}"/>
+              <a:t>Rise Phase Duration, </a:t>
+            </a:r>
+            <a:r>
+              <a:rPr lang="en-US" sz="1300" i="1" dirty="0">
+                <a:latin typeface="Arial" panose="020B0604020202020204" pitchFamily="34" charset="0"/>
+                <a:ea typeface="Tahoma" panose="020B0604030504040204" pitchFamily="34" charset="0"/>
+                <a:cs typeface="Arial" panose="020B0604020202020204" pitchFamily="34" charset="0"/>
+              </a:rPr>
+              <a:t>t</a:t>
+            </a:r>
+            <a:r>
+              <a:rPr lang="en-US" sz="1300" i="1" baseline="-25000" dirty="0">
+                <a:latin typeface="Arial" panose="020B0604020202020204" pitchFamily="34" charset="0"/>
+                <a:ea typeface="Tahoma" panose="020B0604030504040204" pitchFamily="34" charset="0"/>
+                <a:cs typeface="Arial" panose="020B0604020202020204" pitchFamily="34" charset="0"/>
+              </a:rPr>
+              <a:t>rise </a:t>
+            </a:r>
+            <a:r>
+              <a:rPr lang="en-US" sz="1300" i="1" dirty="0">
+                <a:latin typeface="Arial" panose="020B0604020202020204" pitchFamily="34" charset="0"/>
+                <a:ea typeface="Tahoma" panose="020B0604030504040204" pitchFamily="34" charset="0"/>
+                <a:cs typeface="Arial" panose="020B0604020202020204" pitchFamily="34" charset="0"/>
+              </a:rPr>
+              <a:t>[min]</a:t>
+            </a:r>
+            <a:endParaRPr lang="en-US" sz="1300" dirty="0">
+              <a:latin typeface="Arial" panose="020B0604020202020204" pitchFamily="34" charset="0"/>
+              <a:ea typeface="Tahoma" panose="020B0604030504040204" pitchFamily="34" charset="0"/>
+              <a:cs typeface="Arial" panose="020B0604020202020204" pitchFamily="34" charset="0"/>
+            </a:endParaRPr>
+          </a:p>
+        </p:txBody>
+      </p:sp>
+      <p:sp>
+        <p:nvSpPr>
+          <p:cNvPr id="17" name="TextBox 16">
+            <a:extLst>
+              <a:ext uri="{FF2B5EF4-FFF2-40B4-BE49-F238E27FC236}">
+                <a16:creationId xmlns:a16="http://schemas.microsoft.com/office/drawing/2014/main" id="{4CA0E9CB-4B34-6CBA-8392-58F17A41B4D7}"/>
               </a:ext>
             </a:extLst>
           </p:cNvPr>
@@ -3928,46 +4004,7 @@
         </p:nvSpPr>
         <p:spPr>
           <a:xfrm>
-            <a:off x="3539513" y="5295046"/>
-            <a:ext cx="1831127" cy="292388"/>
-          </a:xfrm>
-          <a:prstGeom prst="rect">
-            <a:avLst/>
-          </a:prstGeom>
-          <a:noFill/>
-        </p:spPr>
-        <p:txBody>
-          <a:bodyPr wrap="square" rtlCol="0">
-            <a:spAutoFit/>
-          </a:bodyPr>
-          <a:lstStyle/>
-          <a:p>
-            <a:r>
-              <a:rPr lang="en-US" sz="1300" dirty="0">
-                <a:latin typeface="Tahoma" panose="020B0604030504040204" pitchFamily="34" charset="0"/>
-                <a:ea typeface="Tahoma" panose="020B0604030504040204" pitchFamily="34" charset="0"/>
-                <a:cs typeface="Tahoma" panose="020B0604030504040204" pitchFamily="34" charset="0"/>
-              </a:rPr>
-              <a:t>Decay Phase Duration</a:t>
-            </a:r>
-          </a:p>
-        </p:txBody>
-      </p:sp>
-      <p:sp>
-        <p:nvSpPr>
-          <p:cNvPr id="18" name="TextBox 17">
-            <a:extLst>
-              <a:ext uri="{FF2B5EF4-FFF2-40B4-BE49-F238E27FC236}">
-                <a16:creationId xmlns:a16="http://schemas.microsoft.com/office/drawing/2014/main" id="{AA1967A1-AF0D-3283-E4FF-2120B639760E}"/>
-              </a:ext>
-            </a:extLst>
-          </p:cNvPr>
-          <p:cNvSpPr txBox="1"/>
-          <p:nvPr/>
-        </p:nvSpPr>
-        <p:spPr>
-          <a:xfrm rot="16200000">
-            <a:off x="6268698" y="3530347"/>
+            <a:off x="3438522" y="5360535"/>
             <a:ext cx="1831127" cy="303919"/>
           </a:xfrm>
           <a:prstGeom prst="rect">
@@ -3996,10 +4033,10 @@
       </p:sp>
       <p:sp>
         <p:nvSpPr>
-          <p:cNvPr id="19" name="TextBox 18">
-            <a:extLst>
-              <a:ext uri="{FF2B5EF4-FFF2-40B4-BE49-F238E27FC236}">
-                <a16:creationId xmlns:a16="http://schemas.microsoft.com/office/drawing/2014/main" id="{3C69C663-B3B1-F11F-60C9-0626A7A1CEA2}"/>
+          <p:cNvPr id="13" name="TextBox 12">
+            <a:extLst>
+              <a:ext uri="{FF2B5EF4-FFF2-40B4-BE49-F238E27FC236}">
+                <a16:creationId xmlns:a16="http://schemas.microsoft.com/office/drawing/2014/main" id="{6A109587-CE01-DD07-A647-BFE0F9357E5A}"/>
               </a:ext>
             </a:extLst>
           </p:cNvPr>
@@ -4007,9 +4044,9 @@
           <p:nvPr/>
         </p:nvSpPr>
         <p:spPr>
-          <a:xfrm rot="16200000">
-            <a:off x="5874541" y="3530346"/>
-            <a:ext cx="1831127" cy="303919"/>
+          <a:xfrm>
+            <a:off x="3311938" y="5392389"/>
+            <a:ext cx="2977911" cy="292388"/>
           </a:xfrm>
           <a:prstGeom prst="rect">
             <a:avLst/>
@@ -4030,17 +4067,46 @@
                 <a:ea typeface="Tahoma" panose="020B0604030504040204" pitchFamily="34" charset="0"/>
                 <a:cs typeface="Tahoma" panose="020B0604030504040204" pitchFamily="34" charset="0"/>
               </a:rPr>
-              <a:t> </a:t>
-            </a:r>
-          </a:p>
-        </p:txBody>
-      </p:sp>
-      <p:sp>
-        <p:nvSpPr>
-          <p:cNvPr id="21" name="TextBox 20">
-            <a:extLst>
-              <a:ext uri="{FF2B5EF4-FFF2-40B4-BE49-F238E27FC236}">
-                <a16:creationId xmlns:a16="http://schemas.microsoft.com/office/drawing/2014/main" id="{2E63D0CA-E0CC-5356-E617-61F1FEB6A7FE}"/>
+              <a:t>Decay Phase Duration, </a:t>
+            </a:r>
+            <a:r>
+              <a:rPr lang="en-US" sz="1300" i="1" dirty="0">
+                <a:latin typeface="Arial" panose="020B0604020202020204" pitchFamily="34" charset="0"/>
+                <a:ea typeface="Tahoma" panose="020B0604030504040204" pitchFamily="34" charset="0"/>
+                <a:cs typeface="Arial" panose="020B0604020202020204" pitchFamily="34" charset="0"/>
+              </a:rPr>
+              <a:t>t</a:t>
+            </a:r>
+            <a:r>
+              <a:rPr lang="en-US" sz="1300" i="1" baseline="-25000" dirty="0">
+                <a:latin typeface="Arial" panose="020B0604020202020204" pitchFamily="34" charset="0"/>
+                <a:ea typeface="Tahoma" panose="020B0604030504040204" pitchFamily="34" charset="0"/>
+                <a:cs typeface="Arial" panose="020B0604020202020204" pitchFamily="34" charset="0"/>
+              </a:rPr>
+              <a:t>decay </a:t>
+            </a:r>
+            <a:r>
+              <a:rPr lang="en-US" sz="1300" i="1" dirty="0">
+                <a:latin typeface="Arial" panose="020B0604020202020204" pitchFamily="34" charset="0"/>
+                <a:ea typeface="Tahoma" panose="020B0604030504040204" pitchFamily="34" charset="0"/>
+                <a:cs typeface="Arial" panose="020B0604020202020204" pitchFamily="34" charset="0"/>
+              </a:rPr>
+              <a:t>[min]</a:t>
+            </a:r>
+            <a:endParaRPr lang="en-US" sz="1300" dirty="0">
+              <a:latin typeface="Arial" panose="020B0604020202020204" pitchFamily="34" charset="0"/>
+              <a:ea typeface="Tahoma" panose="020B0604030504040204" pitchFamily="34" charset="0"/>
+              <a:cs typeface="Arial" panose="020B0604020202020204" pitchFamily="34" charset="0"/>
+            </a:endParaRPr>
+          </a:p>
+        </p:txBody>
+      </p:sp>
+      <p:sp>
+        <p:nvSpPr>
+          <p:cNvPr id="18" name="TextBox 17">
+            <a:extLst>
+              <a:ext uri="{FF2B5EF4-FFF2-40B4-BE49-F238E27FC236}">
+                <a16:creationId xmlns:a16="http://schemas.microsoft.com/office/drawing/2014/main" id="{AA1967A1-AF0D-3283-E4FF-2120B639760E}"/>
               </a:ext>
             </a:extLst>
           </p:cNvPr>
@@ -4048,8 +4114,8 @@
           <p:nvPr/>
         </p:nvSpPr>
         <p:spPr>
-          <a:xfrm rot="21258663">
-            <a:off x="8027275" y="5401694"/>
+          <a:xfrm rot="16200000">
+            <a:off x="6268698" y="3530347"/>
             <a:ext cx="1831127" cy="303919"/>
           </a:xfrm>
           <a:prstGeom prst="rect">
@@ -4078,10 +4144,10 @@
       </p:sp>
       <p:sp>
         <p:nvSpPr>
-          <p:cNvPr id="11" name="TextBox 10">
-            <a:extLst>
-              <a:ext uri="{FF2B5EF4-FFF2-40B4-BE49-F238E27FC236}">
-                <a16:creationId xmlns:a16="http://schemas.microsoft.com/office/drawing/2014/main" id="{1306B5FD-6B73-A2BB-603B-35F193E5067A}"/>
+          <p:cNvPr id="19" name="TextBox 18">
+            <a:extLst>
+              <a:ext uri="{FF2B5EF4-FFF2-40B4-BE49-F238E27FC236}">
+                <a16:creationId xmlns:a16="http://schemas.microsoft.com/office/drawing/2014/main" id="{3C69C663-B3B1-F11F-60C9-0626A7A1CEA2}"/>
               </a:ext>
             </a:extLst>
           </p:cNvPr>
@@ -4089,14 +4155,16 @@
           <p:nvPr/>
         </p:nvSpPr>
         <p:spPr>
-          <a:xfrm>
-            <a:off x="9061898" y="5327811"/>
-            <a:ext cx="807058" cy="292388"/>
+          <a:xfrm rot="16200000">
+            <a:off x="5874541" y="3530346"/>
+            <a:ext cx="1831127" cy="303919"/>
           </a:xfrm>
           <a:prstGeom prst="rect">
             <a:avLst/>
           </a:prstGeom>
-          <a:noFill/>
+          <a:solidFill>
+            <a:schemeClr val="bg1"/>
+          </a:solidFill>
         </p:spPr>
         <p:txBody>
           <a:bodyPr wrap="square" rtlCol="0">
@@ -4110,8 +4178,109 @@
                 <a:ea typeface="Tahoma" panose="020B0604030504040204" pitchFamily="34" charset="0"/>
                 <a:cs typeface="Tahoma" panose="020B0604030504040204" pitchFamily="34" charset="0"/>
               </a:rPr>
-              <a:t>Duration</a:t>
-            </a:r>
+              <a:t> </a:t>
+            </a:r>
+          </a:p>
+        </p:txBody>
+      </p:sp>
+      <p:sp>
+        <p:nvSpPr>
+          <p:cNvPr id="21" name="TextBox 20">
+            <a:extLst>
+              <a:ext uri="{FF2B5EF4-FFF2-40B4-BE49-F238E27FC236}">
+                <a16:creationId xmlns:a16="http://schemas.microsoft.com/office/drawing/2014/main" id="{2E63D0CA-E0CC-5356-E617-61F1FEB6A7FE}"/>
+              </a:ext>
+            </a:extLst>
+          </p:cNvPr>
+          <p:cNvSpPr txBox="1"/>
+          <p:nvPr/>
+        </p:nvSpPr>
+        <p:spPr>
+          <a:xfrm rot="21258663">
+            <a:off x="8027275" y="5401694"/>
+            <a:ext cx="1831127" cy="303919"/>
+          </a:xfrm>
+          <a:prstGeom prst="rect">
+            <a:avLst/>
+          </a:prstGeom>
+          <a:solidFill>
+            <a:schemeClr val="bg1"/>
+          </a:solidFill>
+        </p:spPr>
+        <p:txBody>
+          <a:bodyPr wrap="square" rtlCol="0">
+            <a:spAutoFit/>
+          </a:bodyPr>
+          <a:lstStyle/>
+          <a:p>
+            <a:r>
+              <a:rPr lang="en-US" sz="1300" dirty="0">
+                <a:latin typeface="Tahoma" panose="020B0604030504040204" pitchFamily="34" charset="0"/>
+                <a:ea typeface="Tahoma" panose="020B0604030504040204" pitchFamily="34" charset="0"/>
+                <a:cs typeface="Tahoma" panose="020B0604030504040204" pitchFamily="34" charset="0"/>
+              </a:rPr>
+              <a:t> </a:t>
+            </a:r>
+          </a:p>
+        </p:txBody>
+      </p:sp>
+      <p:sp>
+        <p:nvSpPr>
+          <p:cNvPr id="11" name="TextBox 10">
+            <a:extLst>
+              <a:ext uri="{FF2B5EF4-FFF2-40B4-BE49-F238E27FC236}">
+                <a16:creationId xmlns:a16="http://schemas.microsoft.com/office/drawing/2014/main" id="{1306B5FD-6B73-A2BB-603B-35F193E5067A}"/>
+              </a:ext>
+            </a:extLst>
+          </p:cNvPr>
+          <p:cNvSpPr txBox="1"/>
+          <p:nvPr/>
+        </p:nvSpPr>
+        <p:spPr>
+          <a:xfrm>
+            <a:off x="8702526" y="5326923"/>
+            <a:ext cx="1365036" cy="292388"/>
+          </a:xfrm>
+          <a:prstGeom prst="rect">
+            <a:avLst/>
+          </a:prstGeom>
+          <a:noFill/>
+        </p:spPr>
+        <p:txBody>
+          <a:bodyPr wrap="square" rtlCol="0">
+            <a:spAutoFit/>
+          </a:bodyPr>
+          <a:lstStyle/>
+          <a:p>
+            <a:r>
+              <a:rPr lang="en-US" sz="1300" dirty="0">
+                <a:latin typeface="Tahoma" panose="020B0604030504040204" pitchFamily="34" charset="0"/>
+                <a:ea typeface="Tahoma" panose="020B0604030504040204" pitchFamily="34" charset="0"/>
+                <a:cs typeface="Tahoma" panose="020B0604030504040204" pitchFamily="34" charset="0"/>
+              </a:rPr>
+              <a:t>Duration, </a:t>
+            </a:r>
+            <a:r>
+              <a:rPr lang="en-US" sz="1300" i="1" dirty="0">
+                <a:latin typeface="Tahoma" panose="020B0604030504040204" pitchFamily="34" charset="0"/>
+                <a:ea typeface="Tahoma" panose="020B0604030504040204" pitchFamily="34" charset="0"/>
+                <a:cs typeface="Tahoma" panose="020B0604030504040204" pitchFamily="34" charset="0"/>
+              </a:rPr>
+              <a:t>t</a:t>
+            </a:r>
+            <a:r>
+              <a:rPr lang="en-US" sz="1300" i="1" baseline="-25000" dirty="0">
+                <a:latin typeface="Tahoma" panose="020B0604030504040204" pitchFamily="34" charset="0"/>
+                <a:ea typeface="Tahoma" panose="020B0604030504040204" pitchFamily="34" charset="0"/>
+                <a:cs typeface="Tahoma" panose="020B0604030504040204" pitchFamily="34" charset="0"/>
+              </a:rPr>
+              <a:t>flare</a:t>
+            </a:r>
+            <a:endParaRPr lang="en-US" sz="1300" i="1" dirty="0">
+              <a:latin typeface="Tahoma" panose="020B0604030504040204" pitchFamily="34" charset="0"/>
+              <a:ea typeface="Tahoma" panose="020B0604030504040204" pitchFamily="34" charset="0"/>
+              <a:cs typeface="Tahoma" panose="020B0604030504040204" pitchFamily="34" charset="0"/>
+            </a:endParaRPr>
           </a:p>
         </p:txBody>
       </p:sp>
@@ -4421,6 +4590,232 @@
           </a:prstGeom>
         </p:spPr>
       </p:pic>
+      <p:sp>
+        <p:nvSpPr>
+          <p:cNvPr id="4" name="TextBox 3">
+            <a:extLst>
+              <a:ext uri="{FF2B5EF4-FFF2-40B4-BE49-F238E27FC236}">
+                <a16:creationId xmlns:a16="http://schemas.microsoft.com/office/drawing/2014/main" id="{176881AD-4B21-AC7A-21A9-5AC7C37B169E}"/>
+              </a:ext>
+            </a:extLst>
+          </p:cNvPr>
+          <p:cNvSpPr txBox="1"/>
+          <p:nvPr/>
+        </p:nvSpPr>
+        <p:spPr>
+          <a:xfrm>
+            <a:off x="8492554" y="5384041"/>
+            <a:ext cx="2872802" cy="292388"/>
+          </a:xfrm>
+          <a:prstGeom prst="rect">
+            <a:avLst/>
+          </a:prstGeom>
+          <a:solidFill>
+            <a:schemeClr val="bg1"/>
+          </a:solidFill>
+        </p:spPr>
+        <p:txBody>
+          <a:bodyPr wrap="square" rtlCol="0">
+            <a:spAutoFit/>
+          </a:bodyPr>
+          <a:lstStyle/>
+          <a:p>
+            <a:r>
+              <a:rPr lang="en-US" sz="1300" dirty="0">
+                <a:latin typeface="Tahoma" panose="020B0604030504040204" pitchFamily="34" charset="0"/>
+                <a:ea typeface="Tahoma" panose="020B0604030504040204" pitchFamily="34" charset="0"/>
+                <a:cs typeface="Tahoma" panose="020B0604030504040204" pitchFamily="34" charset="0"/>
+              </a:rPr>
+              <a:t>Flare Duration, </a:t>
+            </a:r>
+            <a:r>
+              <a:rPr lang="en-US" sz="1300" i="1" dirty="0">
+                <a:latin typeface="Tahoma" panose="020B0604030504040204" pitchFamily="34" charset="0"/>
+                <a:ea typeface="Tahoma" panose="020B0604030504040204" pitchFamily="34" charset="0"/>
+                <a:cs typeface="Tahoma" panose="020B0604030504040204" pitchFamily="34" charset="0"/>
+              </a:rPr>
+              <a:t>t</a:t>
+            </a:r>
+            <a:r>
+              <a:rPr lang="en-US" sz="1300" i="1" baseline="-25000" dirty="0">
+                <a:latin typeface="Tahoma" panose="020B0604030504040204" pitchFamily="34" charset="0"/>
+                <a:ea typeface="Tahoma" panose="020B0604030504040204" pitchFamily="34" charset="0"/>
+                <a:cs typeface="Tahoma" panose="020B0604030504040204" pitchFamily="34" charset="0"/>
+              </a:rPr>
+              <a:t>flare </a:t>
+            </a:r>
+            <a:r>
+              <a:rPr lang="en-US" sz="1300" i="1" dirty="0">
+                <a:latin typeface="Tahoma" panose="020B0604030504040204" pitchFamily="34" charset="0"/>
+                <a:ea typeface="Tahoma" panose="020B0604030504040204" pitchFamily="34" charset="0"/>
+                <a:cs typeface="Tahoma" panose="020B0604030504040204" pitchFamily="34" charset="0"/>
+              </a:rPr>
+              <a:t>[min]</a:t>
+            </a:r>
+            <a:endParaRPr lang="en-US" sz="1300" dirty="0">
+              <a:latin typeface="Arial" panose="020B0604020202020204" pitchFamily="34" charset="0"/>
+              <a:ea typeface="Tahoma" panose="020B0604030504040204" pitchFamily="34" charset="0"/>
+              <a:cs typeface="Arial" panose="020B0604020202020204" pitchFamily="34" charset="0"/>
+            </a:endParaRPr>
+          </a:p>
+        </p:txBody>
+      </p:sp>
+      <p:sp>
+        <p:nvSpPr>
+          <p:cNvPr id="5" name="TextBox 4">
+            <a:extLst>
+              <a:ext uri="{FF2B5EF4-FFF2-40B4-BE49-F238E27FC236}">
+                <a16:creationId xmlns:a16="http://schemas.microsoft.com/office/drawing/2014/main" id="{0590A85A-9336-B6C7-F70B-FC5E663E4BD2}"/>
+              </a:ext>
+            </a:extLst>
+          </p:cNvPr>
+          <p:cNvSpPr txBox="1"/>
+          <p:nvPr/>
+        </p:nvSpPr>
+        <p:spPr>
+          <a:xfrm>
+            <a:off x="3838759" y="1192848"/>
+            <a:ext cx="1770702" cy="400110"/>
+          </a:xfrm>
+          <a:prstGeom prst="rect">
+            <a:avLst/>
+          </a:prstGeom>
+          <a:solidFill>
+            <a:schemeClr val="bg1"/>
+          </a:solidFill>
+        </p:spPr>
+        <p:txBody>
+          <a:bodyPr wrap="square" rtlCol="0">
+            <a:spAutoFit/>
+          </a:bodyPr>
+          <a:lstStyle/>
+          <a:p>
+            <a:r>
+              <a:rPr lang="en-US" sz="2000" i="1" dirty="0">
+                <a:latin typeface="Arial" panose="020B0604020202020204" pitchFamily="34" charset="0"/>
+                <a:ea typeface="Tahoma" panose="020B0604030504040204" pitchFamily="34" charset="0"/>
+                <a:cs typeface="Arial" panose="020B0604020202020204" pitchFamily="34" charset="0"/>
+              </a:rPr>
+              <a:t>  t</a:t>
+            </a:r>
+            <a:r>
+              <a:rPr lang="en-US" sz="2000" i="1" baseline="-25000" dirty="0">
+                <a:latin typeface="Arial" panose="020B0604020202020204" pitchFamily="34" charset="0"/>
+                <a:ea typeface="Tahoma" panose="020B0604030504040204" pitchFamily="34" charset="0"/>
+                <a:cs typeface="Arial" panose="020B0604020202020204" pitchFamily="34" charset="0"/>
+              </a:rPr>
+              <a:t>rise </a:t>
+            </a:r>
+            <a:r>
+              <a:rPr lang="en-US" sz="2000" i="1" dirty="0">
+                <a:latin typeface="Arial" panose="020B0604020202020204" pitchFamily="34" charset="0"/>
+                <a:ea typeface="Tahoma" panose="020B0604030504040204" pitchFamily="34" charset="0"/>
+                <a:cs typeface="Arial" panose="020B0604020202020204" pitchFamily="34" charset="0"/>
+              </a:rPr>
+              <a:t>vs. t</a:t>
+            </a:r>
+            <a:r>
+              <a:rPr lang="en-US" sz="2000" i="1" baseline="-25000" dirty="0">
+                <a:latin typeface="Arial" panose="020B0604020202020204" pitchFamily="34" charset="0"/>
+                <a:ea typeface="Tahoma" panose="020B0604030504040204" pitchFamily="34" charset="0"/>
+                <a:cs typeface="Arial" panose="020B0604020202020204" pitchFamily="34" charset="0"/>
+              </a:rPr>
+              <a:t>decay</a:t>
+            </a:r>
+            <a:endParaRPr lang="en-US" sz="2000" dirty="0">
+              <a:latin typeface="Arial" panose="020B0604020202020204" pitchFamily="34" charset="0"/>
+              <a:ea typeface="Tahoma" panose="020B0604030504040204" pitchFamily="34" charset="0"/>
+              <a:cs typeface="Arial" panose="020B0604020202020204" pitchFamily="34" charset="0"/>
+            </a:endParaRPr>
+          </a:p>
+        </p:txBody>
+      </p:sp>
+      <p:sp>
+        <p:nvSpPr>
+          <p:cNvPr id="6" name="TextBox 5">
+            <a:extLst>
+              <a:ext uri="{FF2B5EF4-FFF2-40B4-BE49-F238E27FC236}">
+                <a16:creationId xmlns:a16="http://schemas.microsoft.com/office/drawing/2014/main" id="{D090D35C-9941-EC5B-382D-21AA1D906777}"/>
+              </a:ext>
+            </a:extLst>
+          </p:cNvPr>
+          <p:cNvSpPr txBox="1"/>
+          <p:nvPr/>
+        </p:nvSpPr>
+        <p:spPr>
+          <a:xfrm>
+            <a:off x="8570360" y="1214376"/>
+            <a:ext cx="2646986" cy="400110"/>
+          </a:xfrm>
+          <a:prstGeom prst="rect">
+            <a:avLst/>
+          </a:prstGeom>
+          <a:solidFill>
+            <a:schemeClr val="bg1"/>
+          </a:solidFill>
+        </p:spPr>
+        <p:txBody>
+          <a:bodyPr wrap="square" rtlCol="0">
+            <a:spAutoFit/>
+          </a:bodyPr>
+          <a:lstStyle/>
+          <a:p>
+            <a:r>
+              <a:rPr lang="en-US" sz="2000" i="1" dirty="0">
+                <a:latin typeface="Arial" panose="020B0604020202020204" pitchFamily="34" charset="0"/>
+                <a:ea typeface="Tahoma" panose="020B0604030504040204" pitchFamily="34" charset="0"/>
+                <a:cs typeface="Arial" panose="020B0604020202020204" pitchFamily="34" charset="0"/>
+              </a:rPr>
+              <a:t>vs. t</a:t>
+            </a:r>
+            <a:r>
+              <a:rPr lang="en-US" sz="2000" i="1" baseline="-25000" dirty="0">
+                <a:latin typeface="Arial" panose="020B0604020202020204" pitchFamily="34" charset="0"/>
+                <a:ea typeface="Tahoma" panose="020B0604030504040204" pitchFamily="34" charset="0"/>
+                <a:cs typeface="Arial" panose="020B0604020202020204" pitchFamily="34" charset="0"/>
+              </a:rPr>
+              <a:t>rise</a:t>
+            </a:r>
+            <a:r>
+              <a:rPr lang="en-US" sz="2000" i="1" dirty="0">
+                <a:latin typeface="Arial" panose="020B0604020202020204" pitchFamily="34" charset="0"/>
+                <a:ea typeface="Tahoma" panose="020B0604030504040204" pitchFamily="34" charset="0"/>
+                <a:cs typeface="Arial" panose="020B0604020202020204" pitchFamily="34" charset="0"/>
+              </a:rPr>
+              <a:t>, t</a:t>
+            </a:r>
+            <a:r>
+              <a:rPr lang="en-US" sz="2000" i="1" baseline="-25000" dirty="0">
+                <a:latin typeface="Arial" panose="020B0604020202020204" pitchFamily="34" charset="0"/>
+                <a:ea typeface="Tahoma" panose="020B0604030504040204" pitchFamily="34" charset="0"/>
+                <a:cs typeface="Arial" panose="020B0604020202020204" pitchFamily="34" charset="0"/>
+              </a:rPr>
+              <a:t>decay, </a:t>
+            </a:r>
+            <a:r>
+              <a:rPr lang="en-US" sz="2000" i="1" dirty="0">
+                <a:latin typeface="Arial" panose="020B0604020202020204" pitchFamily="34" charset="0"/>
+                <a:ea typeface="Tahoma" panose="020B0604030504040204" pitchFamily="34" charset="0"/>
+                <a:cs typeface="Arial" panose="020B0604020202020204" pitchFamily="34" charset="0"/>
+              </a:rPr>
+              <a:t>t</a:t>
+            </a:r>
+            <a:r>
+              <a:rPr lang="en-US" sz="2000" i="1" baseline="-25000" dirty="0">
+                <a:latin typeface="Arial" panose="020B0604020202020204" pitchFamily="34" charset="0"/>
+                <a:ea typeface="Tahoma" panose="020B0604030504040204" pitchFamily="34" charset="0"/>
+                <a:cs typeface="Arial" panose="020B0604020202020204" pitchFamily="34" charset="0"/>
+              </a:rPr>
+              <a:t>flare</a:t>
+            </a:r>
+            <a:endParaRPr lang="en-US" sz="2000" dirty="0">
+              <a:latin typeface="Arial" panose="020B0604020202020204" pitchFamily="34" charset="0"/>
+              <a:ea typeface="Tahoma" panose="020B0604030504040204" pitchFamily="34" charset="0"/>
+              <a:cs typeface="Arial" panose="020B0604020202020204" pitchFamily="34" charset="0"/>
+            </a:endParaRPr>
+          </a:p>
+        </p:txBody>
+      </p:sp>
     </p:spTree>
     <p:extLst>
       <p:ext uri="{BB962C8B-B14F-4D97-AF65-F5344CB8AC3E}">
@@ -4725,6 +5120,954 @@
     <p:extLst>
       <p:ext uri="{BB962C8B-B14F-4D97-AF65-F5344CB8AC3E}">
         <p14:creationId xmlns:p14="http://schemas.microsoft.com/office/powerpoint/2010/main" val="811487632"/>
+      </p:ext>
+    </p:extLst>
+  </p:cSld>
+  <p:clrMapOvr>
+    <a:masterClrMapping/>
+  </p:clrMapOvr>
+</p:sld>
+</file>
+
+<file path=ppt/slides/slide3.xml><?xml version="1.0" encoding="utf-8"?>
+<p:sld xmlns:a="http://schemas.openxmlformats.org/drawingml/2006/main" xmlns:r="http://schemas.openxmlformats.org/officeDocument/2006/relationships" xmlns:p="http://schemas.openxmlformats.org/presentationml/2006/main">
+  <p:cSld>
+    <p:spTree>
+      <p:nvGrpSpPr>
+        <p:cNvPr id="1" name=""/>
+        <p:cNvGrpSpPr/>
+        <p:nvPr/>
+      </p:nvGrpSpPr>
+      <p:grpSpPr>
+        <a:xfrm>
+          <a:off x="0" y="0"/>
+          <a:ext cx="0" cy="0"/>
+          <a:chOff x="0" y="0"/>
+          <a:chExt cx="0" cy="0"/>
+        </a:xfrm>
+      </p:grpSpPr>
+      <p:pic>
+        <p:nvPicPr>
+          <p:cNvPr id="1028" name="Picture 4">
+            <a:extLst>
+              <a:ext uri="{FF2B5EF4-FFF2-40B4-BE49-F238E27FC236}">
+                <a16:creationId xmlns:a16="http://schemas.microsoft.com/office/drawing/2014/main" id="{935C9152-56FF-2870-4892-CA516E8DA72F}"/>
+              </a:ext>
+            </a:extLst>
+          </p:cNvPr>
+          <p:cNvPicPr>
+            <a:picLocks noChangeAspect="1" noChangeArrowheads="1"/>
+          </p:cNvPicPr>
+          <p:nvPr/>
+        </p:nvPicPr>
+        <p:blipFill>
+          <a:blip r:embed="rId3">
+            <a:extLst>
+              <a:ext uri="{28A0092B-C50C-407E-A947-70E740481C1C}">
+                <a14:useLocalDpi xmlns:a14="http://schemas.microsoft.com/office/drawing/2010/main" val="0"/>
+              </a:ext>
+            </a:extLst>
+          </a:blip>
+          <a:srcRect/>
+          <a:stretch>
+            <a:fillRect/>
+          </a:stretch>
+        </p:blipFill>
+        <p:spPr bwMode="auto">
+          <a:xfrm>
+            <a:off x="2728738" y="1554496"/>
+            <a:ext cx="7214252" cy="3953748"/>
+          </a:xfrm>
+          <a:prstGeom prst="rect">
+            <a:avLst/>
+          </a:prstGeom>
+          <a:noFill/>
+          <a:extLst>
+            <a:ext uri="{909E8E84-426E-40DD-AFC4-6F175D3DCCD1}">
+              <a14:hiddenFill xmlns:a14="http://schemas.microsoft.com/office/drawing/2010/main">
+                <a:solidFill>
+                  <a:srgbClr val="FFFFFF"/>
+                </a:solidFill>
+              </a14:hiddenFill>
+            </a:ext>
+          </a:extLst>
+        </p:spPr>
+      </p:pic>
+      <p:pic>
+        <p:nvPicPr>
+          <p:cNvPr id="5" name="Picture 4">
+            <a:extLst>
+              <a:ext uri="{FF2B5EF4-FFF2-40B4-BE49-F238E27FC236}">
+                <a16:creationId xmlns:a16="http://schemas.microsoft.com/office/drawing/2014/main" id="{D5F2A2D9-B973-AC26-B7AE-5F93BD2BCC25}"/>
+              </a:ext>
+            </a:extLst>
+          </p:cNvPr>
+          <p:cNvPicPr>
+            <a:picLocks noChangeAspect="1"/>
+          </p:cNvPicPr>
+          <p:nvPr/>
+        </p:nvPicPr>
+        <p:blipFill>
+          <a:blip r:embed="rId4"/>
+          <a:stretch>
+            <a:fillRect/>
+          </a:stretch>
+        </p:blipFill>
+        <p:spPr>
+          <a:xfrm>
+            <a:off x="6287022" y="2631607"/>
+            <a:ext cx="214356" cy="1795954"/>
+          </a:xfrm>
+          <a:prstGeom prst="rect">
+            <a:avLst/>
+          </a:prstGeom>
+        </p:spPr>
+      </p:pic>
+      <p:pic>
+        <p:nvPicPr>
+          <p:cNvPr id="6" name="Picture 5">
+            <a:extLst>
+              <a:ext uri="{FF2B5EF4-FFF2-40B4-BE49-F238E27FC236}">
+                <a16:creationId xmlns:a16="http://schemas.microsoft.com/office/drawing/2014/main" id="{75B239CC-62EB-FC7E-A9D1-45C27B595535}"/>
+              </a:ext>
+            </a:extLst>
+          </p:cNvPr>
+          <p:cNvPicPr>
+            <a:picLocks noChangeAspect="1"/>
+          </p:cNvPicPr>
+          <p:nvPr/>
+        </p:nvPicPr>
+        <p:blipFill>
+          <a:blip r:embed="rId4"/>
+          <a:stretch>
+            <a:fillRect/>
+          </a:stretch>
+        </p:blipFill>
+        <p:spPr>
+          <a:xfrm>
+            <a:off x="2755372" y="2623624"/>
+            <a:ext cx="214356" cy="1795951"/>
+          </a:xfrm>
+          <a:prstGeom prst="rect">
+            <a:avLst/>
+          </a:prstGeom>
+        </p:spPr>
+      </p:pic>
+      <p:sp>
+        <p:nvSpPr>
+          <p:cNvPr id="8" name="TextBox 7">
+            <a:extLst>
+              <a:ext uri="{FF2B5EF4-FFF2-40B4-BE49-F238E27FC236}">
+                <a16:creationId xmlns:a16="http://schemas.microsoft.com/office/drawing/2014/main" id="{FE569838-9F86-728F-7184-B6BCF0380657}"/>
+              </a:ext>
+            </a:extLst>
+          </p:cNvPr>
+          <p:cNvSpPr txBox="1"/>
+          <p:nvPr/>
+        </p:nvSpPr>
+        <p:spPr>
+          <a:xfrm>
+            <a:off x="3386612" y="5255013"/>
+            <a:ext cx="1639072" cy="184666"/>
+          </a:xfrm>
+          <a:prstGeom prst="rect">
+            <a:avLst/>
+          </a:prstGeom>
+          <a:solidFill>
+            <a:schemeClr val="bg1"/>
+          </a:solidFill>
+        </p:spPr>
+        <p:txBody>
+          <a:bodyPr wrap="square" lIns="0" tIns="0" rIns="0" bIns="0" rtlCol="0">
+            <a:spAutoFit/>
+          </a:bodyPr>
+          <a:lstStyle/>
+          <a:p>
+            <a:r>
+              <a:rPr lang="en-US" sz="1200" dirty="0">
+                <a:latin typeface="Tahoma" panose="020B0604030504040204" pitchFamily="34" charset="0"/>
+                <a:ea typeface="Tahoma" panose="020B0604030504040204" pitchFamily="34" charset="0"/>
+                <a:cs typeface="Tahoma" panose="020B0604030504040204" pitchFamily="34" charset="0"/>
+              </a:rPr>
+              <a:t>Max. Reconnection Rate</a:t>
+            </a:r>
+          </a:p>
+        </p:txBody>
+      </p:sp>
+      <p:sp>
+        <p:nvSpPr>
+          <p:cNvPr id="9" name="TextBox 8">
+            <a:extLst>
+              <a:ext uri="{FF2B5EF4-FFF2-40B4-BE49-F238E27FC236}">
+                <a16:creationId xmlns:a16="http://schemas.microsoft.com/office/drawing/2014/main" id="{903D8579-42E3-EB43-A5E0-A23A105D7200}"/>
+              </a:ext>
+            </a:extLst>
+          </p:cNvPr>
+          <p:cNvSpPr txBox="1"/>
+          <p:nvPr/>
+        </p:nvSpPr>
+        <p:spPr>
+          <a:xfrm>
+            <a:off x="7101864" y="5264157"/>
+            <a:ext cx="1557503" cy="184666"/>
+          </a:xfrm>
+          <a:prstGeom prst="rect">
+            <a:avLst/>
+          </a:prstGeom>
+          <a:solidFill>
+            <a:schemeClr val="bg1"/>
+          </a:solidFill>
+        </p:spPr>
+        <p:txBody>
+          <a:bodyPr wrap="square" lIns="0" tIns="0" rIns="0" bIns="0" rtlCol="0">
+            <a:spAutoFit/>
+          </a:bodyPr>
+          <a:lstStyle/>
+          <a:p>
+            <a:r>
+              <a:rPr lang="en-US" sz="1200" dirty="0">
+                <a:latin typeface="Tahoma" panose="020B0604030504040204" pitchFamily="34" charset="0"/>
+                <a:ea typeface="Tahoma" panose="020B0604030504040204" pitchFamily="34" charset="0"/>
+                <a:cs typeface="Tahoma" panose="020B0604030504040204" pitchFamily="34" charset="0"/>
+              </a:rPr>
+              <a:t>Peak GOES 1-8 Å Flux </a:t>
+            </a:r>
+          </a:p>
+        </p:txBody>
+      </p:sp>
+    </p:spTree>
+    <p:extLst>
+      <p:ext uri="{BB962C8B-B14F-4D97-AF65-F5344CB8AC3E}">
+        <p14:creationId xmlns:p14="http://schemas.microsoft.com/office/powerpoint/2010/main" val="3679835051"/>
+      </p:ext>
+    </p:extLst>
+  </p:cSld>
+  <p:clrMapOvr>
+    <a:masterClrMapping/>
+  </p:clrMapOvr>
+</p:sld>
+</file>
+
+<file path=ppt/slides/slide4.xml><?xml version="1.0" encoding="utf-8"?>
+<p:sld xmlns:a="http://schemas.openxmlformats.org/drawingml/2006/main" xmlns:r="http://schemas.openxmlformats.org/officeDocument/2006/relationships" xmlns:p="http://schemas.openxmlformats.org/presentationml/2006/main">
+  <p:cSld>
+    <p:spTree>
+      <p:nvGrpSpPr>
+        <p:cNvPr id="1" name=""/>
+        <p:cNvGrpSpPr/>
+        <p:nvPr/>
+      </p:nvGrpSpPr>
+      <p:grpSpPr>
+        <a:xfrm>
+          <a:off x="0" y="0"/>
+          <a:ext cx="0" cy="0"/>
+          <a:chOff x="0" y="0"/>
+          <a:chExt cx="0" cy="0"/>
+        </a:xfrm>
+      </p:grpSpPr>
+      <p:pic>
+        <p:nvPicPr>
+          <p:cNvPr id="5" name="Picture 4">
+            <a:extLst>
+              <a:ext uri="{FF2B5EF4-FFF2-40B4-BE49-F238E27FC236}">
+                <a16:creationId xmlns:a16="http://schemas.microsoft.com/office/drawing/2014/main" id="{96C30208-5E61-6C30-959A-6B81B27EACA2}"/>
+              </a:ext>
+            </a:extLst>
+          </p:cNvPr>
+          <p:cNvPicPr>
+            <a:picLocks noChangeAspect="1"/>
+          </p:cNvPicPr>
+          <p:nvPr/>
+        </p:nvPicPr>
+        <p:blipFill>
+          <a:blip r:embed="rId2"/>
+          <a:stretch>
+            <a:fillRect/>
+          </a:stretch>
+        </p:blipFill>
+        <p:spPr>
+          <a:xfrm>
+            <a:off x="2565400" y="0"/>
+            <a:ext cx="7061200" cy="6858000"/>
+          </a:xfrm>
+          <a:prstGeom prst="rect">
+            <a:avLst/>
+          </a:prstGeom>
+        </p:spPr>
+      </p:pic>
+      <p:sp>
+        <p:nvSpPr>
+          <p:cNvPr id="6" name="Rectangle 5">
+            <a:extLst>
+              <a:ext uri="{FF2B5EF4-FFF2-40B4-BE49-F238E27FC236}">
+                <a16:creationId xmlns:a16="http://schemas.microsoft.com/office/drawing/2014/main" id="{302F796B-FB07-417F-9C93-1346E79FB199}"/>
+              </a:ext>
+            </a:extLst>
+          </p:cNvPr>
+          <p:cNvSpPr/>
+          <p:nvPr/>
+        </p:nvSpPr>
+        <p:spPr>
+          <a:xfrm>
+            <a:off x="4096512" y="2971800"/>
+            <a:ext cx="557784" cy="393192"/>
+          </a:xfrm>
+          <a:prstGeom prst="rect">
+            <a:avLst/>
+          </a:prstGeom>
+          <a:solidFill>
+            <a:schemeClr val="bg1"/>
+          </a:solidFill>
+          <a:ln>
+            <a:solidFill>
+              <a:schemeClr val="bg1"/>
+            </a:solidFill>
+          </a:ln>
+        </p:spPr>
+        <p:style>
+          <a:lnRef idx="2">
+            <a:schemeClr val="accent1">
+              <a:shade val="15000"/>
+            </a:schemeClr>
+          </a:lnRef>
+          <a:fillRef idx="1">
+            <a:schemeClr val="accent1"/>
+          </a:fillRef>
+          <a:effectRef idx="0">
+            <a:schemeClr val="accent1"/>
+          </a:effectRef>
+          <a:fontRef idx="minor">
+            <a:schemeClr val="lt1"/>
+          </a:fontRef>
+        </p:style>
+        <p:txBody>
+          <a:bodyPr rtlCol="0" anchor="ctr"/>
+          <a:lstStyle/>
+          <a:p>
+            <a:pPr algn="ctr"/>
+            <a:endParaRPr lang="en-US"/>
+          </a:p>
+        </p:txBody>
+      </p:sp>
+      <p:sp>
+        <p:nvSpPr>
+          <p:cNvPr id="7" name="Rectangle 6">
+            <a:extLst>
+              <a:ext uri="{FF2B5EF4-FFF2-40B4-BE49-F238E27FC236}">
+                <a16:creationId xmlns:a16="http://schemas.microsoft.com/office/drawing/2014/main" id="{F343AD6D-447F-3B33-1ADD-FFE7A2089B37}"/>
+              </a:ext>
+            </a:extLst>
+          </p:cNvPr>
+          <p:cNvSpPr/>
+          <p:nvPr/>
+        </p:nvSpPr>
+        <p:spPr>
+          <a:xfrm>
+            <a:off x="5823712" y="3035808"/>
+            <a:ext cx="193040" cy="329184"/>
+          </a:xfrm>
+          <a:prstGeom prst="rect">
+            <a:avLst/>
+          </a:prstGeom>
+          <a:solidFill>
+            <a:schemeClr val="bg1"/>
+          </a:solidFill>
+          <a:ln>
+            <a:solidFill>
+              <a:schemeClr val="bg1"/>
+            </a:solidFill>
+          </a:ln>
+        </p:spPr>
+        <p:style>
+          <a:lnRef idx="2">
+            <a:schemeClr val="accent1">
+              <a:shade val="15000"/>
+            </a:schemeClr>
+          </a:lnRef>
+          <a:fillRef idx="1">
+            <a:schemeClr val="accent1"/>
+          </a:fillRef>
+          <a:effectRef idx="0">
+            <a:schemeClr val="accent1"/>
+          </a:effectRef>
+          <a:fontRef idx="minor">
+            <a:schemeClr val="lt1"/>
+          </a:fontRef>
+        </p:style>
+        <p:txBody>
+          <a:bodyPr rtlCol="0" anchor="ctr"/>
+          <a:lstStyle/>
+          <a:p>
+            <a:pPr algn="ctr"/>
+            <a:endParaRPr lang="en-US"/>
+          </a:p>
+        </p:txBody>
+      </p:sp>
+      <p:sp>
+        <p:nvSpPr>
+          <p:cNvPr id="8" name="Rectangle 7">
+            <a:extLst>
+              <a:ext uri="{FF2B5EF4-FFF2-40B4-BE49-F238E27FC236}">
+                <a16:creationId xmlns:a16="http://schemas.microsoft.com/office/drawing/2014/main" id="{9E9A5DA9-0165-C780-C22E-496054300659}"/>
+              </a:ext>
+            </a:extLst>
+          </p:cNvPr>
+          <p:cNvSpPr/>
+          <p:nvPr/>
+        </p:nvSpPr>
+        <p:spPr>
+          <a:xfrm>
+            <a:off x="6044692" y="3044952"/>
+            <a:ext cx="405384" cy="329184"/>
+          </a:xfrm>
+          <a:prstGeom prst="rect">
+            <a:avLst/>
+          </a:prstGeom>
+          <a:solidFill>
+            <a:schemeClr val="bg1"/>
+          </a:solidFill>
+          <a:ln>
+            <a:solidFill>
+              <a:schemeClr val="bg1"/>
+            </a:solidFill>
+          </a:ln>
+        </p:spPr>
+        <p:style>
+          <a:lnRef idx="2">
+            <a:schemeClr val="accent1">
+              <a:shade val="15000"/>
+            </a:schemeClr>
+          </a:lnRef>
+          <a:fillRef idx="1">
+            <a:schemeClr val="accent1"/>
+          </a:fillRef>
+          <a:effectRef idx="0">
+            <a:schemeClr val="accent1"/>
+          </a:effectRef>
+          <a:fontRef idx="minor">
+            <a:schemeClr val="lt1"/>
+          </a:fontRef>
+        </p:style>
+        <p:txBody>
+          <a:bodyPr rtlCol="0" anchor="ctr"/>
+          <a:lstStyle/>
+          <a:p>
+            <a:pPr algn="ctr"/>
+            <a:endParaRPr lang="en-US"/>
+          </a:p>
+        </p:txBody>
+      </p:sp>
+      <p:sp>
+        <p:nvSpPr>
+          <p:cNvPr id="9" name="Rectangle 8">
+            <a:extLst>
+              <a:ext uri="{FF2B5EF4-FFF2-40B4-BE49-F238E27FC236}">
+                <a16:creationId xmlns:a16="http://schemas.microsoft.com/office/drawing/2014/main" id="{D9D77129-9648-5C3D-A2D3-C5963BC21F4A}"/>
+              </a:ext>
+            </a:extLst>
+          </p:cNvPr>
+          <p:cNvSpPr/>
+          <p:nvPr/>
+        </p:nvSpPr>
+        <p:spPr>
+          <a:xfrm>
+            <a:off x="8812276" y="3054096"/>
+            <a:ext cx="185420" cy="329184"/>
+          </a:xfrm>
+          <a:prstGeom prst="rect">
+            <a:avLst/>
+          </a:prstGeom>
+          <a:solidFill>
+            <a:schemeClr val="bg1"/>
+          </a:solidFill>
+          <a:ln>
+            <a:solidFill>
+              <a:schemeClr val="bg1"/>
+            </a:solidFill>
+          </a:ln>
+        </p:spPr>
+        <p:style>
+          <a:lnRef idx="2">
+            <a:schemeClr val="accent1">
+              <a:shade val="15000"/>
+            </a:schemeClr>
+          </a:lnRef>
+          <a:fillRef idx="1">
+            <a:schemeClr val="accent1"/>
+          </a:fillRef>
+          <a:effectRef idx="0">
+            <a:schemeClr val="accent1"/>
+          </a:effectRef>
+          <a:fontRef idx="minor">
+            <a:schemeClr val="lt1"/>
+          </a:fontRef>
+        </p:style>
+        <p:txBody>
+          <a:bodyPr rtlCol="0" anchor="ctr"/>
+          <a:lstStyle/>
+          <a:p>
+            <a:pPr algn="ctr"/>
+            <a:endParaRPr lang="en-US"/>
+          </a:p>
+        </p:txBody>
+      </p:sp>
+      <p:sp>
+        <p:nvSpPr>
+          <p:cNvPr id="10" name="Rectangle 9">
+            <a:extLst>
+              <a:ext uri="{FF2B5EF4-FFF2-40B4-BE49-F238E27FC236}">
+                <a16:creationId xmlns:a16="http://schemas.microsoft.com/office/drawing/2014/main" id="{B9B9D48D-1F16-946E-46CE-2090421C502C}"/>
+              </a:ext>
+            </a:extLst>
+          </p:cNvPr>
+          <p:cNvSpPr/>
+          <p:nvPr/>
+        </p:nvSpPr>
+        <p:spPr>
+          <a:xfrm>
+            <a:off x="9015730" y="3031236"/>
+            <a:ext cx="292862" cy="329184"/>
+          </a:xfrm>
+          <a:prstGeom prst="rect">
+            <a:avLst/>
+          </a:prstGeom>
+          <a:solidFill>
+            <a:schemeClr val="bg1"/>
+          </a:solidFill>
+          <a:ln>
+            <a:solidFill>
+              <a:schemeClr val="bg1"/>
+            </a:solidFill>
+          </a:ln>
+        </p:spPr>
+        <p:style>
+          <a:lnRef idx="2">
+            <a:schemeClr val="accent1">
+              <a:shade val="15000"/>
+            </a:schemeClr>
+          </a:lnRef>
+          <a:fillRef idx="1">
+            <a:schemeClr val="accent1"/>
+          </a:fillRef>
+          <a:effectRef idx="0">
+            <a:schemeClr val="accent1"/>
+          </a:effectRef>
+          <a:fontRef idx="minor">
+            <a:schemeClr val="lt1"/>
+          </a:fontRef>
+        </p:style>
+        <p:txBody>
+          <a:bodyPr rtlCol="0" anchor="ctr"/>
+          <a:lstStyle/>
+          <a:p>
+            <a:pPr algn="ctr"/>
+            <a:endParaRPr lang="en-US"/>
+          </a:p>
+        </p:txBody>
+      </p:sp>
+      <p:sp>
+        <p:nvSpPr>
+          <p:cNvPr id="11" name="TextBox 10">
+            <a:extLst>
+              <a:ext uri="{FF2B5EF4-FFF2-40B4-BE49-F238E27FC236}">
+                <a16:creationId xmlns:a16="http://schemas.microsoft.com/office/drawing/2014/main" id="{6C81D83A-7605-1AB0-9134-8B8271456AEF}"/>
+              </a:ext>
+            </a:extLst>
+          </p:cNvPr>
+          <p:cNvSpPr txBox="1"/>
+          <p:nvPr/>
+        </p:nvSpPr>
+        <p:spPr>
+          <a:xfrm rot="16200000">
+            <a:off x="3995492" y="3257780"/>
+            <a:ext cx="1082989" cy="323165"/>
+          </a:xfrm>
+          <a:prstGeom prst="rect">
+            <a:avLst/>
+          </a:prstGeom>
+          <a:noFill/>
+        </p:spPr>
+        <p:txBody>
+          <a:bodyPr wrap="none" rtlCol="0">
+            <a:spAutoFit/>
+          </a:bodyPr>
+          <a:lstStyle/>
+          <a:p>
+            <a:r>
+              <a:rPr lang="en-US" sz="1500" i="1" dirty="0">
+                <a:solidFill>
+                  <a:schemeClr val="accent6">
+                    <a:lumMod val="75000"/>
+                  </a:schemeClr>
+                </a:solidFill>
+                <a:latin typeface="Tahoma" panose="020B0604030504040204" pitchFamily="34" charset="0"/>
+                <a:ea typeface="Tahoma" panose="020B0604030504040204" pitchFamily="34" charset="0"/>
+                <a:cs typeface="Tahoma" panose="020B0604030504040204" pitchFamily="34" charset="0"/>
+              </a:rPr>
+              <a:t>Start, flare</a:t>
+            </a:r>
+          </a:p>
+        </p:txBody>
+      </p:sp>
+      <p:sp>
+        <p:nvSpPr>
+          <p:cNvPr id="12" name="TextBox 11">
+            <a:extLst>
+              <a:ext uri="{FF2B5EF4-FFF2-40B4-BE49-F238E27FC236}">
+                <a16:creationId xmlns:a16="http://schemas.microsoft.com/office/drawing/2014/main" id="{4C765697-57FA-AA5F-C0ED-4F1B6E11E7D3}"/>
+              </a:ext>
+            </a:extLst>
+          </p:cNvPr>
+          <p:cNvSpPr txBox="1"/>
+          <p:nvPr/>
+        </p:nvSpPr>
+        <p:spPr>
+          <a:xfrm rot="16200000">
+            <a:off x="5041954" y="3254766"/>
+            <a:ext cx="1076961" cy="323165"/>
+          </a:xfrm>
+          <a:prstGeom prst="rect">
+            <a:avLst/>
+          </a:prstGeom>
+          <a:noFill/>
+        </p:spPr>
+        <p:txBody>
+          <a:bodyPr wrap="none" rtlCol="0">
+            <a:spAutoFit/>
+          </a:bodyPr>
+          <a:lstStyle/>
+          <a:p>
+            <a:r>
+              <a:rPr lang="en-US" sz="1500" i="1" dirty="0">
+                <a:solidFill>
+                  <a:schemeClr val="accent2">
+                    <a:lumMod val="60000"/>
+                    <a:lumOff val="40000"/>
+                  </a:schemeClr>
+                </a:solidFill>
+                <a:latin typeface="Tahoma" panose="020B0604030504040204" pitchFamily="34" charset="0"/>
+                <a:ea typeface="Tahoma" panose="020B0604030504040204" pitchFamily="34" charset="0"/>
+                <a:cs typeface="Tahoma" panose="020B0604030504040204" pitchFamily="34" charset="0"/>
+              </a:rPr>
+              <a:t>Peak, flare</a:t>
+            </a:r>
+          </a:p>
+        </p:txBody>
+      </p:sp>
+      <p:sp>
+        <p:nvSpPr>
+          <p:cNvPr id="13" name="TextBox 12">
+            <a:extLst>
+              <a:ext uri="{FF2B5EF4-FFF2-40B4-BE49-F238E27FC236}">
+                <a16:creationId xmlns:a16="http://schemas.microsoft.com/office/drawing/2014/main" id="{BD354E97-DAAF-8B06-B4C6-70E34C9B8A7B}"/>
+              </a:ext>
+            </a:extLst>
+          </p:cNvPr>
+          <p:cNvSpPr txBox="1"/>
+          <p:nvPr/>
+        </p:nvSpPr>
+        <p:spPr>
+          <a:xfrm rot="16200000">
+            <a:off x="8083391" y="3244556"/>
+            <a:ext cx="998030" cy="323165"/>
+          </a:xfrm>
+          <a:prstGeom prst="rect">
+            <a:avLst/>
+          </a:prstGeom>
+          <a:noFill/>
+        </p:spPr>
+        <p:txBody>
+          <a:bodyPr wrap="none" rtlCol="0">
+            <a:spAutoFit/>
+          </a:bodyPr>
+          <a:lstStyle/>
+          <a:p>
+            <a:r>
+              <a:rPr lang="en-US" sz="1500" i="1" dirty="0">
+                <a:solidFill>
+                  <a:schemeClr val="tx2">
+                    <a:lumMod val="75000"/>
+                  </a:schemeClr>
+                </a:solidFill>
+                <a:latin typeface="Tahoma" panose="020B0604030504040204" pitchFamily="34" charset="0"/>
+                <a:ea typeface="Tahoma" panose="020B0604030504040204" pitchFamily="34" charset="0"/>
+                <a:cs typeface="Tahoma" panose="020B0604030504040204" pitchFamily="34" charset="0"/>
+              </a:rPr>
+              <a:t>End, flare</a:t>
+            </a:r>
+          </a:p>
+        </p:txBody>
+      </p:sp>
+      <p:cxnSp>
+        <p:nvCxnSpPr>
+          <p:cNvPr id="15" name="Straight Connector 14">
+            <a:extLst>
+              <a:ext uri="{FF2B5EF4-FFF2-40B4-BE49-F238E27FC236}">
+                <a16:creationId xmlns:a16="http://schemas.microsoft.com/office/drawing/2014/main" id="{BC437486-5AC0-183D-7D33-25522877C9BF}"/>
+              </a:ext>
+            </a:extLst>
+          </p:cNvPr>
+          <p:cNvCxnSpPr>
+            <a:cxnSpLocks/>
+          </p:cNvCxnSpPr>
+          <p:nvPr/>
+        </p:nvCxnSpPr>
+        <p:spPr>
+          <a:xfrm>
+            <a:off x="5324408" y="365125"/>
+            <a:ext cx="0" cy="4588840"/>
+          </a:xfrm>
+          <a:prstGeom prst="line">
+            <a:avLst/>
+          </a:prstGeom>
+          <a:ln w="38100">
+            <a:solidFill>
+              <a:srgbClr val="D00E5B"/>
+            </a:solidFill>
+            <a:prstDash val="sysDash"/>
+          </a:ln>
+        </p:spPr>
+        <p:style>
+          <a:lnRef idx="1">
+            <a:schemeClr val="accent1"/>
+          </a:lnRef>
+          <a:fillRef idx="0">
+            <a:schemeClr val="accent1"/>
+          </a:fillRef>
+          <a:effectRef idx="0">
+            <a:schemeClr val="accent1"/>
+          </a:effectRef>
+          <a:fontRef idx="minor">
+            <a:schemeClr val="tx1"/>
+          </a:fontRef>
+        </p:style>
+      </p:cxnSp>
+      <p:sp>
+        <p:nvSpPr>
+          <p:cNvPr id="18" name="TextBox 17">
+            <a:extLst>
+              <a:ext uri="{FF2B5EF4-FFF2-40B4-BE49-F238E27FC236}">
+                <a16:creationId xmlns:a16="http://schemas.microsoft.com/office/drawing/2014/main" id="{AE2B5052-9C63-6F4D-6F73-CDC98A1991C2}"/>
+              </a:ext>
+            </a:extLst>
+          </p:cNvPr>
+          <p:cNvSpPr txBox="1"/>
+          <p:nvPr/>
+        </p:nvSpPr>
+        <p:spPr>
+          <a:xfrm rot="16200000">
+            <a:off x="4080574" y="1977461"/>
+            <a:ext cx="2164503" cy="323165"/>
+          </a:xfrm>
+          <a:prstGeom prst="rect">
+            <a:avLst/>
+          </a:prstGeom>
+          <a:noFill/>
+        </p:spPr>
+        <p:txBody>
+          <a:bodyPr wrap="none" rtlCol="0">
+            <a:spAutoFit/>
+          </a:bodyPr>
+          <a:lstStyle/>
+          <a:p>
+            <a:r>
+              <a:rPr lang="en-US" sz="1500" i="1" dirty="0">
+                <a:solidFill>
+                  <a:srgbClr val="D00E5B"/>
+                </a:solidFill>
+                <a:latin typeface="Tahoma" panose="020B0604030504040204" pitchFamily="34" charset="0"/>
+                <a:ea typeface="Tahoma" panose="020B0604030504040204" pitchFamily="34" charset="0"/>
+                <a:cs typeface="Tahoma" panose="020B0604030504040204" pitchFamily="34" charset="0"/>
+              </a:rPr>
+              <a:t>Start, impulsive phase*</a:t>
+            </a:r>
+          </a:p>
+        </p:txBody>
+      </p:sp>
+      <p:cxnSp>
+        <p:nvCxnSpPr>
+          <p:cNvPr id="19" name="Straight Connector 18">
+            <a:extLst>
+              <a:ext uri="{FF2B5EF4-FFF2-40B4-BE49-F238E27FC236}">
+                <a16:creationId xmlns:a16="http://schemas.microsoft.com/office/drawing/2014/main" id="{C1CC6C45-555E-9655-A8BB-A03669CC447C}"/>
+              </a:ext>
+            </a:extLst>
+          </p:cNvPr>
+          <p:cNvCxnSpPr>
+            <a:cxnSpLocks/>
+          </p:cNvCxnSpPr>
+          <p:nvPr/>
+        </p:nvCxnSpPr>
+        <p:spPr>
+          <a:xfrm>
+            <a:off x="6854193" y="1109691"/>
+            <a:ext cx="0" cy="3844274"/>
+          </a:xfrm>
+          <a:prstGeom prst="line">
+            <a:avLst/>
+          </a:prstGeom>
+          <a:ln w="38100">
+            <a:solidFill>
+              <a:srgbClr val="339CC3"/>
+            </a:solidFill>
+            <a:prstDash val="sysDash"/>
+          </a:ln>
+        </p:spPr>
+        <p:style>
+          <a:lnRef idx="1">
+            <a:schemeClr val="accent1"/>
+          </a:lnRef>
+          <a:fillRef idx="0">
+            <a:schemeClr val="accent1"/>
+          </a:fillRef>
+          <a:effectRef idx="0">
+            <a:schemeClr val="accent1"/>
+          </a:effectRef>
+          <a:fontRef idx="minor">
+            <a:schemeClr val="tx1"/>
+          </a:fontRef>
+        </p:style>
+      </p:cxnSp>
+      <p:cxnSp>
+        <p:nvCxnSpPr>
+          <p:cNvPr id="20" name="Straight Connector 19">
+            <a:extLst>
+              <a:ext uri="{FF2B5EF4-FFF2-40B4-BE49-F238E27FC236}">
+                <a16:creationId xmlns:a16="http://schemas.microsoft.com/office/drawing/2014/main" id="{ADA400CF-0CCA-60E6-C051-7CFBB0CE0637}"/>
+              </a:ext>
+            </a:extLst>
+          </p:cNvPr>
+          <p:cNvCxnSpPr>
+            <a:cxnSpLocks/>
+          </p:cNvCxnSpPr>
+          <p:nvPr/>
+        </p:nvCxnSpPr>
+        <p:spPr>
+          <a:xfrm>
+            <a:off x="6842618" y="330400"/>
+            <a:ext cx="0" cy="86288"/>
+          </a:xfrm>
+          <a:prstGeom prst="line">
+            <a:avLst/>
+          </a:prstGeom>
+          <a:ln w="38100">
+            <a:solidFill>
+              <a:srgbClr val="339CC3"/>
+            </a:solidFill>
+            <a:prstDash val="sysDash"/>
+          </a:ln>
+        </p:spPr>
+        <p:style>
+          <a:lnRef idx="1">
+            <a:schemeClr val="accent1"/>
+          </a:lnRef>
+          <a:fillRef idx="0">
+            <a:schemeClr val="accent1"/>
+          </a:fillRef>
+          <a:effectRef idx="0">
+            <a:schemeClr val="accent1"/>
+          </a:effectRef>
+          <a:fontRef idx="minor">
+            <a:schemeClr val="tx1"/>
+          </a:fontRef>
+        </p:style>
+      </p:cxnSp>
+      <p:sp>
+        <p:nvSpPr>
+          <p:cNvPr id="23" name="TextBox 22">
+            <a:extLst>
+              <a:ext uri="{FF2B5EF4-FFF2-40B4-BE49-F238E27FC236}">
+                <a16:creationId xmlns:a16="http://schemas.microsoft.com/office/drawing/2014/main" id="{D12F620E-50E0-A14F-33A7-2B0A4F99BB24}"/>
+              </a:ext>
+            </a:extLst>
+          </p:cNvPr>
+          <p:cNvSpPr txBox="1"/>
+          <p:nvPr/>
+        </p:nvSpPr>
+        <p:spPr>
+          <a:xfrm rot="16200000">
+            <a:off x="5507754" y="3789738"/>
+            <a:ext cx="2374240" cy="230832"/>
+          </a:xfrm>
+          <a:prstGeom prst="rect">
+            <a:avLst/>
+          </a:prstGeom>
+          <a:solidFill>
+            <a:schemeClr val="bg1">
+              <a:alpha val="55000"/>
+            </a:schemeClr>
+          </a:solidFill>
+        </p:spPr>
+        <p:txBody>
+          <a:bodyPr wrap="none" lIns="0" tIns="0" rIns="0" bIns="0" rtlCol="0">
+            <a:spAutoFit/>
+          </a:bodyPr>
+          <a:lstStyle/>
+          <a:p>
+            <a:r>
+              <a:rPr lang="en-US" sz="1500" i="1" dirty="0">
+                <a:solidFill>
+                  <a:srgbClr val="339CC3"/>
+                </a:solidFill>
+                <a:latin typeface="Tahoma" panose="020B0604030504040204" pitchFamily="34" charset="0"/>
+                <a:ea typeface="Tahoma" panose="020B0604030504040204" pitchFamily="34" charset="0"/>
+                <a:cs typeface="Tahoma" panose="020B0604030504040204" pitchFamily="34" charset="0"/>
+              </a:rPr>
+              <a:t>Start, gradual decay phase*</a:t>
+            </a:r>
+          </a:p>
+        </p:txBody>
+      </p:sp>
+      <p:cxnSp>
+        <p:nvCxnSpPr>
+          <p:cNvPr id="24" name="Straight Connector 23">
+            <a:extLst>
+              <a:ext uri="{FF2B5EF4-FFF2-40B4-BE49-F238E27FC236}">
+                <a16:creationId xmlns:a16="http://schemas.microsoft.com/office/drawing/2014/main" id="{4D783B88-A5E5-15B5-040B-B1E3E73E7BD7}"/>
+              </a:ext>
+            </a:extLst>
+          </p:cNvPr>
+          <p:cNvCxnSpPr>
+            <a:cxnSpLocks/>
+          </p:cNvCxnSpPr>
+          <p:nvPr/>
+        </p:nvCxnSpPr>
+        <p:spPr>
+          <a:xfrm>
+            <a:off x="8752336" y="343228"/>
+            <a:ext cx="0" cy="86288"/>
+          </a:xfrm>
+          <a:prstGeom prst="line">
+            <a:avLst/>
+          </a:prstGeom>
+          <a:ln w="50800">
+            <a:solidFill>
+              <a:schemeClr val="tx2">
+                <a:lumMod val="75000"/>
+              </a:schemeClr>
+            </a:solidFill>
+            <a:prstDash val="sysDash"/>
+          </a:ln>
+        </p:spPr>
+        <p:style>
+          <a:lnRef idx="1">
+            <a:schemeClr val="accent1"/>
+          </a:lnRef>
+          <a:fillRef idx="0">
+            <a:schemeClr val="accent1"/>
+          </a:fillRef>
+          <a:effectRef idx="0">
+            <a:schemeClr val="accent1"/>
+          </a:effectRef>
+          <a:fontRef idx="minor">
+            <a:schemeClr val="tx1"/>
+          </a:fontRef>
+        </p:style>
+      </p:cxnSp>
+    </p:spTree>
+    <p:extLst>
+      <p:ext uri="{BB962C8B-B14F-4D97-AF65-F5344CB8AC3E}">
+        <p14:creationId xmlns:p14="http://schemas.microsoft.com/office/powerpoint/2010/main" val="1654804195"/>
       </p:ext>
     </p:extLst>
   </p:cSld>

</xml_diff>

<commit_message>
February modifications to reconnection rate and paper
</commit_message>
<xml_diff>
--- a/flaredurs.pptx
+++ b/flaredurs.pptx
@@ -200,7 +200,7 @@
           <a:p>
             <a:fld id="{FF93A664-D126-DB44-87D9-436527C5F2E5}" type="datetimeFigureOut">
               <a:rPr lang="en-US" smtClean="0"/>
-              <a:t>1/12/24</a:t>
+              <a:t>2/8/24</a:t>
             </a:fld>
             <a:endParaRPr lang="en-US"/>
           </a:p>
@@ -782,7 +782,7 @@
           <a:p>
             <a:fld id="{32A03D38-162D-6B47-8553-9CD5AB2EE2B5}" type="datetimeFigureOut">
               <a:rPr lang="en-US" smtClean="0"/>
-              <a:t>1/12/24</a:t>
+              <a:t>2/8/24</a:t>
             </a:fld>
             <a:endParaRPr lang="en-US"/>
           </a:p>
@@ -980,7 +980,7 @@
           <a:p>
             <a:fld id="{32A03D38-162D-6B47-8553-9CD5AB2EE2B5}" type="datetimeFigureOut">
               <a:rPr lang="en-US" smtClean="0"/>
-              <a:t>1/12/24</a:t>
+              <a:t>2/8/24</a:t>
             </a:fld>
             <a:endParaRPr lang="en-US"/>
           </a:p>
@@ -1188,7 +1188,7 @@
           <a:p>
             <a:fld id="{32A03D38-162D-6B47-8553-9CD5AB2EE2B5}" type="datetimeFigureOut">
               <a:rPr lang="en-US" smtClean="0"/>
-              <a:t>1/12/24</a:t>
+              <a:t>2/8/24</a:t>
             </a:fld>
             <a:endParaRPr lang="en-US"/>
           </a:p>
@@ -1386,7 +1386,7 @@
           <a:p>
             <a:fld id="{32A03D38-162D-6B47-8553-9CD5AB2EE2B5}" type="datetimeFigureOut">
               <a:rPr lang="en-US" smtClean="0"/>
-              <a:t>1/12/24</a:t>
+              <a:t>2/8/24</a:t>
             </a:fld>
             <a:endParaRPr lang="en-US"/>
           </a:p>
@@ -1661,7 +1661,7 @@
           <a:p>
             <a:fld id="{32A03D38-162D-6B47-8553-9CD5AB2EE2B5}" type="datetimeFigureOut">
               <a:rPr lang="en-US" smtClean="0"/>
-              <a:t>1/12/24</a:t>
+              <a:t>2/8/24</a:t>
             </a:fld>
             <a:endParaRPr lang="en-US"/>
           </a:p>
@@ -1926,7 +1926,7 @@
           <a:p>
             <a:fld id="{32A03D38-162D-6B47-8553-9CD5AB2EE2B5}" type="datetimeFigureOut">
               <a:rPr lang="en-US" smtClean="0"/>
-              <a:t>1/12/24</a:t>
+              <a:t>2/8/24</a:t>
             </a:fld>
             <a:endParaRPr lang="en-US"/>
           </a:p>
@@ -2338,7 +2338,7 @@
           <a:p>
             <a:fld id="{32A03D38-162D-6B47-8553-9CD5AB2EE2B5}" type="datetimeFigureOut">
               <a:rPr lang="en-US" smtClean="0"/>
-              <a:t>1/12/24</a:t>
+              <a:t>2/8/24</a:t>
             </a:fld>
             <a:endParaRPr lang="en-US"/>
           </a:p>
@@ -2479,7 +2479,7 @@
           <a:p>
             <a:fld id="{32A03D38-162D-6B47-8553-9CD5AB2EE2B5}" type="datetimeFigureOut">
               <a:rPr lang="en-US" smtClean="0"/>
-              <a:t>1/12/24</a:t>
+              <a:t>2/8/24</a:t>
             </a:fld>
             <a:endParaRPr lang="en-US"/>
           </a:p>
@@ -2592,7 +2592,7 @@
           <a:p>
             <a:fld id="{32A03D38-162D-6B47-8553-9CD5AB2EE2B5}" type="datetimeFigureOut">
               <a:rPr lang="en-US" smtClean="0"/>
-              <a:t>1/12/24</a:t>
+              <a:t>2/8/24</a:t>
             </a:fld>
             <a:endParaRPr lang="en-US"/>
           </a:p>
@@ -2903,7 +2903,7 @@
           <a:p>
             <a:fld id="{32A03D38-162D-6B47-8553-9CD5AB2EE2B5}" type="datetimeFigureOut">
               <a:rPr lang="en-US" smtClean="0"/>
-              <a:t>1/12/24</a:t>
+              <a:t>2/8/24</a:t>
             </a:fld>
             <a:endParaRPr lang="en-US"/>
           </a:p>
@@ -3191,7 +3191,7 @@
           <a:p>
             <a:fld id="{32A03D38-162D-6B47-8553-9CD5AB2EE2B5}" type="datetimeFigureOut">
               <a:rPr lang="en-US" smtClean="0"/>
-              <a:t>1/12/24</a:t>
+              <a:t>2/8/24</a:t>
             </a:fld>
             <a:endParaRPr lang="en-US"/>
           </a:p>
@@ -3432,7 +3432,7 @@
           <a:p>
             <a:fld id="{32A03D38-162D-6B47-8553-9CD5AB2EE2B5}" type="datetimeFigureOut">
               <a:rPr lang="en-US" smtClean="0"/>
-              <a:t>1/12/24</a:t>
+              <a:t>2/8/24</a:t>
             </a:fld>
             <a:endParaRPr lang="en-US"/>
           </a:p>
@@ -5148,49 +5148,32 @@
       </p:grpSpPr>
       <p:pic>
         <p:nvPicPr>
-          <p:cNvPr id="1028" name="Picture 4">
-            <a:extLst>
-              <a:ext uri="{FF2B5EF4-FFF2-40B4-BE49-F238E27FC236}">
-                <a16:creationId xmlns:a16="http://schemas.microsoft.com/office/drawing/2014/main" id="{935C9152-56FF-2870-4892-CA516E8DA72F}"/>
+          <p:cNvPr id="3" name="Picture 2">
+            <a:extLst>
+              <a:ext uri="{FF2B5EF4-FFF2-40B4-BE49-F238E27FC236}">
+                <a16:creationId xmlns:a16="http://schemas.microsoft.com/office/drawing/2014/main" id="{1C85F2E5-E3C5-FC2D-4D52-424FBB3C963C}"/>
               </a:ext>
             </a:extLst>
           </p:cNvPr>
           <p:cNvPicPr>
-            <a:picLocks noChangeAspect="1" noChangeArrowheads="1"/>
+            <a:picLocks noChangeAspect="1"/>
           </p:cNvPicPr>
           <p:nvPr/>
         </p:nvPicPr>
         <p:blipFill>
-          <a:blip r:embed="rId3">
-            <a:extLst>
-              <a:ext uri="{28A0092B-C50C-407E-A947-70E740481C1C}">
-                <a14:useLocalDpi xmlns:a14="http://schemas.microsoft.com/office/drawing/2010/main" val="0"/>
-              </a:ext>
-            </a:extLst>
-          </a:blip>
-          <a:srcRect/>
+          <a:blip r:embed="rId3"/>
           <a:stretch>
             <a:fillRect/>
           </a:stretch>
         </p:blipFill>
-        <p:spPr bwMode="auto">
+        <p:spPr>
           <a:xfrm>
-            <a:off x="2728738" y="1554496"/>
-            <a:ext cx="7214252" cy="3953748"/>
+            <a:off x="2135153" y="1330584"/>
+            <a:ext cx="8398716" cy="4199358"/>
           </a:xfrm>
           <a:prstGeom prst="rect">
             <a:avLst/>
           </a:prstGeom>
-          <a:noFill/>
-          <a:extLst>
-            <a:ext uri="{909E8E84-426E-40DD-AFC4-6F175D3DCCD1}">
-              <a14:hiddenFill xmlns:a14="http://schemas.microsoft.com/office/drawing/2010/main">
-                <a:solidFill>
-                  <a:srgbClr val="FFFFFF"/>
-                </a:solidFill>
-              </a14:hiddenFill>
-            </a:ext>
-          </a:extLst>
         </p:spPr>
       </p:pic>
       <p:pic>
@@ -5308,8 +5291,8 @@
         </p:nvSpPr>
         <p:spPr>
           <a:xfrm>
-            <a:off x="7101864" y="5264157"/>
-            <a:ext cx="1557503" cy="184666"/>
+            <a:off x="7126917" y="5270420"/>
+            <a:ext cx="1522306" cy="184666"/>
           </a:xfrm>
           <a:prstGeom prst="rect">
             <a:avLst/>

</xml_diff>